<commit_message>
[master] updated lesson 6 and 7 with clarification and example
</commit_message>
<xml_diff>
--- a/theory_07-application-programming-interface/theory_07-application_programming_interface.pptx
+++ b/theory_07-application-programming-interface/theory_07-application_programming_interface.pptx
@@ -222,7 +222,7 @@
           <a:p>
             <a:fld id="{251090E0-FB0C-49E9-9864-9F53EABEA96F}" type="datetimeFigureOut">
               <a:rPr lang="en-GB" smtClean="0"/>
-              <a:t>08/04/2024</a:t>
+              <a:t>14/04/2024</a:t>
             </a:fld>
             <a:endParaRPr lang="en-GB"/>
           </a:p>
@@ -9388,8 +9388,16 @@
           <a:lstStyle/>
           <a:p>
             <a:r>
+              <a:rPr lang="it-IT" dirty="0" err="1"/>
+              <a:t>GraphQL</a:t>
+            </a:r>
+            <a:r>
               <a:rPr lang="it-IT" dirty="0"/>
-              <a:t>ADD EXAMPLE</a:t>
+              <a:t>: </a:t>
+            </a:r>
+            <a:r>
+              <a:rPr lang="it-IT" dirty="0" err="1"/>
+              <a:t>Example</a:t>
             </a:r>
             <a:endParaRPr lang="en-GB" dirty="0"/>
           </a:p>
@@ -9405,15 +9413,85 @@
             <p:ph idx="1"/>
           </p:nvPr>
         </p:nvSpPr>
-        <p:spPr/>
-        <p:txBody>
-          <a:bodyPr/>
+        <p:spPr>
+          <a:xfrm>
+            <a:off x="395514" y="1135069"/>
+            <a:ext cx="11368314" cy="4858203"/>
+          </a:xfrm>
+        </p:spPr>
+        <p:txBody>
+          <a:bodyPr>
+            <a:normAutofit/>
+          </a:bodyPr>
           <a:lstStyle/>
           <a:p>
+            <a:pPr marL="0" indent="0">
+              <a:buNone/>
+            </a:pPr>
             <a:r>
               <a:rPr lang="en-GB" dirty="0"/>
-              <a:t>ADD EXAMPLE</a:t>
-            </a:r>
+              <a:t>For example, a </a:t>
+            </a:r>
+            <a:r>
+              <a:rPr lang="en-GB" dirty="0" err="1"/>
+              <a:t>GraphQL</a:t>
+            </a:r>
+            <a:r>
+              <a:rPr lang="en-GB" dirty="0"/>
+              <a:t> service that tells you who the logged in user is (me) as well as that user’s name might look like this:</a:t>
+            </a:r>
+          </a:p>
+          <a:p>
+            <a:endParaRPr lang="en-GB" sz="2400" dirty="0"/>
+          </a:p>
+          <a:p>
+            <a:pPr marL="0" indent="0">
+              <a:buNone/>
+            </a:pPr>
+            <a:endParaRPr lang="en-GB" sz="2400" dirty="0"/>
+          </a:p>
+          <a:p>
+            <a:pPr marL="0" indent="0">
+              <a:buNone/>
+            </a:pPr>
+            <a:r>
+              <a:rPr lang="en-GB" sz="2400" dirty="0"/>
+              <a:t>Along with functions for each field on each type:</a:t>
+            </a:r>
+          </a:p>
+          <a:p>
+            <a:endParaRPr lang="en-GB" sz="2400" dirty="0"/>
+          </a:p>
+          <a:p>
+            <a:pPr marL="0" indent="0">
+              <a:buNone/>
+            </a:pPr>
+            <a:endParaRPr lang="en-GB" sz="2400" dirty="0"/>
+          </a:p>
+          <a:p>
+            <a:pPr marL="0" indent="0">
+              <a:buNone/>
+            </a:pPr>
+            <a:endParaRPr lang="en-GB" sz="2400" dirty="0"/>
+          </a:p>
+          <a:p>
+            <a:pPr marL="0" indent="0">
+              <a:buNone/>
+            </a:pPr>
+            <a:r>
+              <a:rPr lang="en-GB" sz="2400" dirty="0"/>
+              <a:t>Then, </a:t>
+            </a:r>
+            <a:r>
+              <a:rPr lang="en-GB" sz="2400" dirty="0" err="1"/>
+              <a:t>GraphQL</a:t>
+            </a:r>
+            <a:r>
+              <a:rPr lang="en-GB" sz="2400" dirty="0"/>
+              <a:t> queries like:</a:t>
+            </a:r>
+          </a:p>
+          <a:p>
             <a:endParaRPr lang="en-GB" sz="2400" dirty="0"/>
           </a:p>
         </p:txBody>
@@ -9438,6 +9516,650 @@
               <a:t>22</a:t>
             </a:fld>
             <a:endParaRPr lang="en-GB"/>
+          </a:p>
+        </p:txBody>
+      </p:sp>
+      <p:sp>
+        <p:nvSpPr>
+          <p:cNvPr id="8" name="Rectangle 7">
+            <a:extLst>
+              <a:ext uri="{FF2B5EF4-FFF2-40B4-BE49-F238E27FC236}">
+                <a16:creationId xmlns:a16="http://schemas.microsoft.com/office/drawing/2014/main" id="{320B5B27-583C-23D4-E681-4CA50906A438}"/>
+              </a:ext>
+            </a:extLst>
+          </p:cNvPr>
+          <p:cNvSpPr/>
+          <p:nvPr/>
+        </p:nvSpPr>
+        <p:spPr>
+          <a:xfrm>
+            <a:off x="9857232" y="161926"/>
+            <a:ext cx="1939254" cy="679322"/>
+          </a:xfrm>
+          <a:prstGeom prst="rect">
+            <a:avLst/>
+          </a:prstGeom>
+        </p:spPr>
+        <p:style>
+          <a:lnRef idx="2">
+            <a:schemeClr val="accent4">
+              <a:shade val="15000"/>
+            </a:schemeClr>
+          </a:lnRef>
+          <a:fillRef idx="1">
+            <a:schemeClr val="accent4"/>
+          </a:fillRef>
+          <a:effectRef idx="0">
+            <a:schemeClr val="accent4"/>
+          </a:effectRef>
+          <a:fontRef idx="minor">
+            <a:schemeClr val="lt1"/>
+          </a:fontRef>
+        </p:style>
+        <p:txBody>
+          <a:bodyPr rtlCol="0" anchor="ctr"/>
+          <a:lstStyle/>
+          <a:p>
+            <a:pPr algn="ctr"/>
+            <a:r>
+              <a:rPr lang="en-US" sz="2000" b="1" dirty="0">
+                <a:latin typeface="Palatino Linotype" panose="02040502050505030304" pitchFamily="18" charset="0"/>
+              </a:rPr>
+              <a:t>NEW SLIDE</a:t>
+            </a:r>
+          </a:p>
+        </p:txBody>
+      </p:sp>
+      <p:sp>
+        <p:nvSpPr>
+          <p:cNvPr id="10" name="TextBox 9">
+            <a:extLst>
+              <a:ext uri="{FF2B5EF4-FFF2-40B4-BE49-F238E27FC236}">
+                <a16:creationId xmlns:a16="http://schemas.microsoft.com/office/drawing/2014/main" id="{5C740F65-AC50-BFF8-7637-C51D0E09B4BF}"/>
+              </a:ext>
+            </a:extLst>
+          </p:cNvPr>
+          <p:cNvSpPr txBox="1"/>
+          <p:nvPr/>
+        </p:nvSpPr>
+        <p:spPr>
+          <a:xfrm>
+            <a:off x="9497639" y="1940550"/>
+            <a:ext cx="2298847" cy="1200329"/>
+          </a:xfrm>
+          <a:prstGeom prst="rect">
+            <a:avLst/>
+          </a:prstGeom>
+          <a:noFill/>
+        </p:spPr>
+        <p:txBody>
+          <a:bodyPr wrap="square">
+            <a:spAutoFit/>
+          </a:bodyPr>
+          <a:lstStyle/>
+          <a:p>
+            <a:pPr marL="0" indent="0">
+              <a:buNone/>
+            </a:pPr>
+            <a:r>
+              <a:rPr lang="en-GB" sz="1800" dirty="0">
+                <a:latin typeface="Menlo" panose="020B0609030804020204" pitchFamily="49" charset="0"/>
+                <a:ea typeface="Menlo" panose="020B0609030804020204" pitchFamily="49" charset="0"/>
+                <a:cs typeface="Menlo" panose="020B0609030804020204" pitchFamily="49" charset="0"/>
+              </a:rPr>
+              <a:t>type User {</a:t>
+            </a:r>
+          </a:p>
+          <a:p>
+            <a:r>
+              <a:rPr lang="en-GB" sz="1800" dirty="0">
+                <a:latin typeface="Menlo" panose="020B0609030804020204" pitchFamily="49" charset="0"/>
+                <a:ea typeface="Menlo" panose="020B0609030804020204" pitchFamily="49" charset="0"/>
+                <a:cs typeface="Menlo" panose="020B0609030804020204" pitchFamily="49" charset="0"/>
+              </a:rPr>
+              <a:t>  id: ID</a:t>
+            </a:r>
+          </a:p>
+          <a:p>
+            <a:r>
+              <a:rPr lang="en-GB" sz="1800" dirty="0">
+                <a:latin typeface="Menlo" panose="020B0609030804020204" pitchFamily="49" charset="0"/>
+                <a:ea typeface="Menlo" panose="020B0609030804020204" pitchFamily="49" charset="0"/>
+                <a:cs typeface="Menlo" panose="020B0609030804020204" pitchFamily="49" charset="0"/>
+              </a:rPr>
+              <a:t>  name: String</a:t>
+            </a:r>
+          </a:p>
+          <a:p>
+            <a:r>
+              <a:rPr lang="en-GB" sz="1800" dirty="0">
+                <a:latin typeface="Menlo" panose="020B0609030804020204" pitchFamily="49" charset="0"/>
+                <a:ea typeface="Menlo" panose="020B0609030804020204" pitchFamily="49" charset="0"/>
+                <a:cs typeface="Menlo" panose="020B0609030804020204" pitchFamily="49" charset="0"/>
+              </a:rPr>
+              <a:t>}</a:t>
+            </a:r>
+          </a:p>
+        </p:txBody>
+      </p:sp>
+      <p:sp>
+        <p:nvSpPr>
+          <p:cNvPr id="12" name="TextBox 11">
+            <a:extLst>
+              <a:ext uri="{FF2B5EF4-FFF2-40B4-BE49-F238E27FC236}">
+                <a16:creationId xmlns:a16="http://schemas.microsoft.com/office/drawing/2014/main" id="{8E3E8514-9CB4-F94D-F3DA-613876B8022B}"/>
+              </a:ext>
+            </a:extLst>
+          </p:cNvPr>
+          <p:cNvSpPr txBox="1"/>
+          <p:nvPr/>
+        </p:nvSpPr>
+        <p:spPr>
+          <a:xfrm>
+            <a:off x="7473690" y="1979205"/>
+            <a:ext cx="2298846" cy="923330"/>
+          </a:xfrm>
+          <a:prstGeom prst="rect">
+            <a:avLst/>
+          </a:prstGeom>
+          <a:noFill/>
+        </p:spPr>
+        <p:txBody>
+          <a:bodyPr wrap="square">
+            <a:spAutoFit/>
+          </a:bodyPr>
+          <a:lstStyle/>
+          <a:p>
+            <a:pPr marL="0" indent="0">
+              <a:buNone/>
+            </a:pPr>
+            <a:r>
+              <a:rPr lang="en-GB" sz="1800" dirty="0">
+                <a:latin typeface="Menlo" panose="020B0609030804020204" pitchFamily="49" charset="0"/>
+                <a:ea typeface="Menlo" panose="020B0609030804020204" pitchFamily="49" charset="0"/>
+                <a:cs typeface="Menlo" panose="020B0609030804020204" pitchFamily="49" charset="0"/>
+              </a:rPr>
+              <a:t>type Query {</a:t>
+            </a:r>
+            <a:br>
+              <a:rPr lang="en-GB" sz="1800" dirty="0">
+                <a:latin typeface="Menlo" panose="020B0609030804020204" pitchFamily="49" charset="0"/>
+                <a:ea typeface="Menlo" panose="020B0609030804020204" pitchFamily="49" charset="0"/>
+                <a:cs typeface="Menlo" panose="020B0609030804020204" pitchFamily="49" charset="0"/>
+              </a:rPr>
+            </a:br>
+            <a:r>
+              <a:rPr lang="en-GB" sz="1800" dirty="0">
+                <a:latin typeface="Menlo" panose="020B0609030804020204" pitchFamily="49" charset="0"/>
+                <a:ea typeface="Menlo" panose="020B0609030804020204" pitchFamily="49" charset="0"/>
+                <a:cs typeface="Menlo" panose="020B0609030804020204" pitchFamily="49" charset="0"/>
+              </a:rPr>
+              <a:t>   me: User</a:t>
+            </a:r>
+            <a:br>
+              <a:rPr lang="en-GB" sz="1800" dirty="0">
+                <a:latin typeface="Menlo" panose="020B0609030804020204" pitchFamily="49" charset="0"/>
+                <a:ea typeface="Menlo" panose="020B0609030804020204" pitchFamily="49" charset="0"/>
+                <a:cs typeface="Menlo" panose="020B0609030804020204" pitchFamily="49" charset="0"/>
+              </a:rPr>
+            </a:br>
+            <a:r>
+              <a:rPr lang="en-GB" sz="1800" dirty="0">
+                <a:latin typeface="Menlo" panose="020B0609030804020204" pitchFamily="49" charset="0"/>
+                <a:ea typeface="Menlo" panose="020B0609030804020204" pitchFamily="49" charset="0"/>
+                <a:cs typeface="Menlo" panose="020B0609030804020204" pitchFamily="49" charset="0"/>
+              </a:rPr>
+              <a:t>}</a:t>
+            </a:r>
+            <a:endParaRPr lang="en-GB" dirty="0">
+              <a:latin typeface="Menlo" panose="020B0609030804020204" pitchFamily="49" charset="0"/>
+              <a:ea typeface="Menlo" panose="020B0609030804020204" pitchFamily="49" charset="0"/>
+              <a:cs typeface="Menlo" panose="020B0609030804020204" pitchFamily="49" charset="0"/>
+            </a:endParaRPr>
+          </a:p>
+        </p:txBody>
+      </p:sp>
+      <p:sp>
+        <p:nvSpPr>
+          <p:cNvPr id="14" name="TextBox 13">
+            <a:extLst>
+              <a:ext uri="{FF2B5EF4-FFF2-40B4-BE49-F238E27FC236}">
+                <a16:creationId xmlns:a16="http://schemas.microsoft.com/office/drawing/2014/main" id="{4E5113E8-00AA-EF29-B374-2634624E05E3}"/>
+              </a:ext>
+            </a:extLst>
+          </p:cNvPr>
+          <p:cNvSpPr txBox="1"/>
+          <p:nvPr/>
+        </p:nvSpPr>
+        <p:spPr>
+          <a:xfrm>
+            <a:off x="3064329" y="3496819"/>
+            <a:ext cx="6098018" cy="923330"/>
+          </a:xfrm>
+          <a:prstGeom prst="rect">
+            <a:avLst/>
+          </a:prstGeom>
+          <a:noFill/>
+        </p:spPr>
+        <p:txBody>
+          <a:bodyPr wrap="square">
+            <a:spAutoFit/>
+          </a:bodyPr>
+          <a:lstStyle/>
+          <a:p>
+            <a:pPr marL="0" indent="0">
+              <a:buNone/>
+            </a:pPr>
+            <a:r>
+              <a:rPr lang="en-GB" sz="1800" dirty="0">
+                <a:latin typeface="Menlo" panose="020B0609030804020204" pitchFamily="49" charset="0"/>
+                <a:ea typeface="Menlo" panose="020B0609030804020204" pitchFamily="49" charset="0"/>
+                <a:cs typeface="Menlo" panose="020B0609030804020204" pitchFamily="49" charset="0"/>
+              </a:rPr>
+              <a:t>function </a:t>
+            </a:r>
+            <a:r>
+              <a:rPr lang="en-GB" sz="1800" dirty="0" err="1">
+                <a:latin typeface="Menlo" panose="020B0609030804020204" pitchFamily="49" charset="0"/>
+                <a:ea typeface="Menlo" panose="020B0609030804020204" pitchFamily="49" charset="0"/>
+                <a:cs typeface="Menlo" panose="020B0609030804020204" pitchFamily="49" charset="0"/>
+              </a:rPr>
+              <a:t>Query_me</a:t>
+            </a:r>
+            <a:r>
+              <a:rPr lang="en-GB" sz="1800" dirty="0">
+                <a:latin typeface="Menlo" panose="020B0609030804020204" pitchFamily="49" charset="0"/>
+                <a:ea typeface="Menlo" panose="020B0609030804020204" pitchFamily="49" charset="0"/>
+                <a:cs typeface="Menlo" panose="020B0609030804020204" pitchFamily="49" charset="0"/>
+              </a:rPr>
+              <a:t>(request) {</a:t>
+            </a:r>
+            <a:br>
+              <a:rPr lang="en-GB" sz="1800" dirty="0">
+                <a:latin typeface="Menlo" panose="020B0609030804020204" pitchFamily="49" charset="0"/>
+                <a:ea typeface="Menlo" panose="020B0609030804020204" pitchFamily="49" charset="0"/>
+                <a:cs typeface="Menlo" panose="020B0609030804020204" pitchFamily="49" charset="0"/>
+              </a:rPr>
+            </a:br>
+            <a:r>
+              <a:rPr lang="en-GB" sz="1800" dirty="0">
+                <a:latin typeface="Menlo" panose="020B0609030804020204" pitchFamily="49" charset="0"/>
+                <a:ea typeface="Menlo" panose="020B0609030804020204" pitchFamily="49" charset="0"/>
+                <a:cs typeface="Menlo" panose="020B0609030804020204" pitchFamily="49" charset="0"/>
+              </a:rPr>
+              <a:t>  return </a:t>
+            </a:r>
+            <a:r>
+              <a:rPr lang="en-GB" sz="1800" dirty="0" err="1">
+                <a:latin typeface="Menlo" panose="020B0609030804020204" pitchFamily="49" charset="0"/>
+                <a:ea typeface="Menlo" panose="020B0609030804020204" pitchFamily="49" charset="0"/>
+                <a:cs typeface="Menlo" panose="020B0609030804020204" pitchFamily="49" charset="0"/>
+              </a:rPr>
+              <a:t>request.auth.user</a:t>
+            </a:r>
+            <a:br>
+              <a:rPr lang="en-GB" sz="1800" dirty="0">
+                <a:latin typeface="Menlo" panose="020B0609030804020204" pitchFamily="49" charset="0"/>
+                <a:ea typeface="Menlo" panose="020B0609030804020204" pitchFamily="49" charset="0"/>
+                <a:cs typeface="Menlo" panose="020B0609030804020204" pitchFamily="49" charset="0"/>
+              </a:rPr>
+            </a:br>
+            <a:r>
+              <a:rPr lang="en-GB" sz="1800" dirty="0">
+                <a:latin typeface="Menlo" panose="020B0609030804020204" pitchFamily="49" charset="0"/>
+                <a:ea typeface="Menlo" panose="020B0609030804020204" pitchFamily="49" charset="0"/>
+                <a:cs typeface="Menlo" panose="020B0609030804020204" pitchFamily="49" charset="0"/>
+              </a:rPr>
+              <a:t>}</a:t>
+            </a:r>
+          </a:p>
+        </p:txBody>
+      </p:sp>
+      <p:sp>
+        <p:nvSpPr>
+          <p:cNvPr id="16" name="TextBox 15">
+            <a:extLst>
+              <a:ext uri="{FF2B5EF4-FFF2-40B4-BE49-F238E27FC236}">
+                <a16:creationId xmlns:a16="http://schemas.microsoft.com/office/drawing/2014/main" id="{EBA253F9-92AD-5C01-2F57-2C8011CEACD6}"/>
+              </a:ext>
+            </a:extLst>
+          </p:cNvPr>
+          <p:cNvSpPr txBox="1"/>
+          <p:nvPr/>
+        </p:nvSpPr>
+        <p:spPr>
+          <a:xfrm>
+            <a:off x="2650680" y="5203484"/>
+            <a:ext cx="1684966" cy="1477328"/>
+          </a:xfrm>
+          <a:prstGeom prst="rect">
+            <a:avLst/>
+          </a:prstGeom>
+          <a:noFill/>
+        </p:spPr>
+        <p:txBody>
+          <a:bodyPr wrap="square">
+            <a:spAutoFit/>
+          </a:bodyPr>
+          <a:lstStyle/>
+          <a:p>
+            <a:pPr marL="0" indent="0">
+              <a:buNone/>
+            </a:pPr>
+            <a:r>
+              <a:rPr lang="en-GB" sz="1800" dirty="0">
+                <a:latin typeface="Menlo" panose="020B0609030804020204" pitchFamily="49" charset="0"/>
+                <a:ea typeface="Menlo" panose="020B0609030804020204" pitchFamily="49" charset="0"/>
+                <a:cs typeface="Menlo" panose="020B0609030804020204" pitchFamily="49" charset="0"/>
+              </a:rPr>
+              <a:t>{</a:t>
+            </a:r>
+          </a:p>
+          <a:p>
+            <a:pPr marL="0" indent="0">
+              <a:buNone/>
+            </a:pPr>
+            <a:r>
+              <a:rPr lang="en-GB" dirty="0">
+                <a:latin typeface="Menlo" panose="020B0609030804020204" pitchFamily="49" charset="0"/>
+                <a:ea typeface="Menlo" panose="020B0609030804020204" pitchFamily="49" charset="0"/>
+                <a:cs typeface="Menlo" panose="020B0609030804020204" pitchFamily="49" charset="0"/>
+              </a:rPr>
+              <a:t>  </a:t>
+            </a:r>
+            <a:r>
+              <a:rPr lang="en-GB" sz="1800" dirty="0">
+                <a:latin typeface="Menlo" panose="020B0609030804020204" pitchFamily="49" charset="0"/>
+                <a:ea typeface="Menlo" panose="020B0609030804020204" pitchFamily="49" charset="0"/>
+                <a:cs typeface="Menlo" panose="020B0609030804020204" pitchFamily="49" charset="0"/>
+              </a:rPr>
+              <a:t>me {</a:t>
+            </a:r>
+          </a:p>
+          <a:p>
+            <a:pPr marL="0" indent="0">
+              <a:buNone/>
+            </a:pPr>
+            <a:r>
+              <a:rPr lang="en-GB" dirty="0">
+                <a:latin typeface="Menlo" panose="020B0609030804020204" pitchFamily="49" charset="0"/>
+                <a:ea typeface="Menlo" panose="020B0609030804020204" pitchFamily="49" charset="0"/>
+                <a:cs typeface="Menlo" panose="020B0609030804020204" pitchFamily="49" charset="0"/>
+              </a:rPr>
+              <a:t>    </a:t>
+            </a:r>
+            <a:r>
+              <a:rPr lang="en-GB" sz="1800" dirty="0">
+                <a:latin typeface="Menlo" panose="020B0609030804020204" pitchFamily="49" charset="0"/>
+                <a:ea typeface="Menlo" panose="020B0609030804020204" pitchFamily="49" charset="0"/>
+                <a:cs typeface="Menlo" panose="020B0609030804020204" pitchFamily="49" charset="0"/>
+              </a:rPr>
+              <a:t>name</a:t>
+            </a:r>
+          </a:p>
+          <a:p>
+            <a:pPr marL="0" indent="0">
+              <a:buNone/>
+            </a:pPr>
+            <a:r>
+              <a:rPr lang="en-GB" sz="1800" dirty="0">
+                <a:latin typeface="Menlo" panose="020B0609030804020204" pitchFamily="49" charset="0"/>
+                <a:ea typeface="Menlo" panose="020B0609030804020204" pitchFamily="49" charset="0"/>
+                <a:cs typeface="Menlo" panose="020B0609030804020204" pitchFamily="49" charset="0"/>
+              </a:rPr>
+              <a:t>  }</a:t>
+            </a:r>
+          </a:p>
+          <a:p>
+            <a:pPr marL="0" indent="0">
+              <a:buNone/>
+            </a:pPr>
+            <a:r>
+              <a:rPr lang="en-GB" sz="1800" dirty="0">
+                <a:latin typeface="Menlo" panose="020B0609030804020204" pitchFamily="49" charset="0"/>
+                <a:ea typeface="Menlo" panose="020B0609030804020204" pitchFamily="49" charset="0"/>
+                <a:cs typeface="Menlo" panose="020B0609030804020204" pitchFamily="49" charset="0"/>
+              </a:rPr>
+              <a:t>}</a:t>
+            </a:r>
+          </a:p>
+        </p:txBody>
+      </p:sp>
+      <p:sp>
+        <p:nvSpPr>
+          <p:cNvPr id="18" name="TextBox 17">
+            <a:extLst>
+              <a:ext uri="{FF2B5EF4-FFF2-40B4-BE49-F238E27FC236}">
+                <a16:creationId xmlns:a16="http://schemas.microsoft.com/office/drawing/2014/main" id="{46B4BF7D-F8B0-3D3E-5818-4E7A224C98AA}"/>
+              </a:ext>
+            </a:extLst>
+          </p:cNvPr>
+          <p:cNvSpPr txBox="1"/>
+          <p:nvPr/>
+        </p:nvSpPr>
+        <p:spPr>
+          <a:xfrm>
+            <a:off x="7473690" y="5120567"/>
+            <a:ext cx="4061691" cy="1477328"/>
+          </a:xfrm>
+          <a:prstGeom prst="rect">
+            <a:avLst/>
+          </a:prstGeom>
+          <a:noFill/>
+        </p:spPr>
+        <p:txBody>
+          <a:bodyPr wrap="square">
+            <a:spAutoFit/>
+          </a:bodyPr>
+          <a:lstStyle/>
+          <a:p>
+            <a:pPr marL="0" indent="0">
+              <a:buNone/>
+            </a:pPr>
+            <a:r>
+              <a:rPr lang="en-GB" sz="1800" dirty="0">
+                <a:latin typeface="Menlo" panose="020B0609030804020204" pitchFamily="49" charset="0"/>
+                <a:ea typeface="Menlo" panose="020B0609030804020204" pitchFamily="49" charset="0"/>
+                <a:cs typeface="Menlo" panose="020B0609030804020204" pitchFamily="49" charset="0"/>
+              </a:rPr>
+              <a:t>{</a:t>
+            </a:r>
+          </a:p>
+          <a:p>
+            <a:pPr marL="0" indent="0">
+              <a:buNone/>
+            </a:pPr>
+            <a:r>
+              <a:rPr lang="en-GB" sz="1800" dirty="0">
+                <a:latin typeface="Menlo" panose="020B0609030804020204" pitchFamily="49" charset="0"/>
+                <a:ea typeface="Menlo" panose="020B0609030804020204" pitchFamily="49" charset="0"/>
+                <a:cs typeface="Menlo" panose="020B0609030804020204" pitchFamily="49" charset="0"/>
+              </a:rPr>
+              <a:t>  "me": {</a:t>
+            </a:r>
+          </a:p>
+          <a:p>
+            <a:pPr marL="0" indent="0">
+              <a:buNone/>
+            </a:pPr>
+            <a:r>
+              <a:rPr lang="en-GB" sz="1800" dirty="0">
+                <a:latin typeface="Menlo" panose="020B0609030804020204" pitchFamily="49" charset="0"/>
+                <a:ea typeface="Menlo" panose="020B0609030804020204" pitchFamily="49" charset="0"/>
+                <a:cs typeface="Menlo" panose="020B0609030804020204" pitchFamily="49" charset="0"/>
+              </a:rPr>
+              <a:t>    "name": "Luke Skywalker"</a:t>
+            </a:r>
+          </a:p>
+          <a:p>
+            <a:pPr marL="0" indent="0">
+              <a:buNone/>
+            </a:pPr>
+            <a:r>
+              <a:rPr lang="en-GB" sz="1800" dirty="0">
+                <a:latin typeface="Menlo" panose="020B0609030804020204" pitchFamily="49" charset="0"/>
+                <a:ea typeface="Menlo" panose="020B0609030804020204" pitchFamily="49" charset="0"/>
+                <a:cs typeface="Menlo" panose="020B0609030804020204" pitchFamily="49" charset="0"/>
+              </a:rPr>
+              <a:t>  }</a:t>
+            </a:r>
+          </a:p>
+          <a:p>
+            <a:pPr marL="0" indent="0">
+              <a:buNone/>
+            </a:pPr>
+            <a:r>
+              <a:rPr lang="en-GB" sz="1800" dirty="0">
+                <a:latin typeface="Menlo" panose="020B0609030804020204" pitchFamily="49" charset="0"/>
+                <a:ea typeface="Menlo" panose="020B0609030804020204" pitchFamily="49" charset="0"/>
+                <a:cs typeface="Menlo" panose="020B0609030804020204" pitchFamily="49" charset="0"/>
+              </a:rPr>
+              <a:t>}</a:t>
+            </a:r>
+          </a:p>
+        </p:txBody>
+      </p:sp>
+      <p:sp>
+        <p:nvSpPr>
+          <p:cNvPr id="20" name="TextBox 19">
+            <a:extLst>
+              <a:ext uri="{FF2B5EF4-FFF2-40B4-BE49-F238E27FC236}">
+                <a16:creationId xmlns:a16="http://schemas.microsoft.com/office/drawing/2014/main" id="{D099D0E5-D755-0446-4F70-63679EECD234}"/>
+              </a:ext>
+            </a:extLst>
+          </p:cNvPr>
+          <p:cNvSpPr txBox="1"/>
+          <p:nvPr/>
+        </p:nvSpPr>
+        <p:spPr>
+          <a:xfrm>
+            <a:off x="4510649" y="5309893"/>
+            <a:ext cx="3138044" cy="1200329"/>
+          </a:xfrm>
+          <a:prstGeom prst="rect">
+            <a:avLst/>
+          </a:prstGeom>
+          <a:noFill/>
+        </p:spPr>
+        <p:txBody>
+          <a:bodyPr wrap="square">
+            <a:spAutoFit/>
+          </a:bodyPr>
+          <a:lstStyle/>
+          <a:p>
+            <a:pPr marL="0" indent="0">
+              <a:buNone/>
+            </a:pPr>
+            <a:r>
+              <a:rPr lang="en-GB" sz="2400" dirty="0">
+                <a:latin typeface="Palatino Linotype" panose="02040502050505030304" pitchFamily="18" charset="0"/>
+              </a:rPr>
+              <a:t>Could produce the following JSON result:</a:t>
+            </a:r>
+          </a:p>
+        </p:txBody>
+      </p:sp>
+      <p:sp>
+        <p:nvSpPr>
+          <p:cNvPr id="22" name="TextBox 21">
+            <a:extLst>
+              <a:ext uri="{FF2B5EF4-FFF2-40B4-BE49-F238E27FC236}">
+                <a16:creationId xmlns:a16="http://schemas.microsoft.com/office/drawing/2014/main" id="{07167192-BADA-56F2-6ACF-6565C49CE429}"/>
+              </a:ext>
+            </a:extLst>
+          </p:cNvPr>
+          <p:cNvSpPr txBox="1"/>
+          <p:nvPr/>
+        </p:nvSpPr>
+        <p:spPr>
+          <a:xfrm>
+            <a:off x="7473690" y="3503957"/>
+            <a:ext cx="6280878" cy="923330"/>
+          </a:xfrm>
+          <a:prstGeom prst="rect">
+            <a:avLst/>
+          </a:prstGeom>
+          <a:noFill/>
+        </p:spPr>
+        <p:txBody>
+          <a:bodyPr wrap="square">
+            <a:spAutoFit/>
+          </a:bodyPr>
+          <a:lstStyle/>
+          <a:p>
+            <a:pPr marL="0" indent="0">
+              <a:buNone/>
+            </a:pPr>
+            <a:r>
+              <a:rPr lang="en-GB" sz="1800" dirty="0">
+                <a:latin typeface="Menlo" panose="020B0609030804020204" pitchFamily="49" charset="0"/>
+                <a:ea typeface="Menlo" panose="020B0609030804020204" pitchFamily="49" charset="0"/>
+                <a:cs typeface="Menlo" panose="020B0609030804020204" pitchFamily="49" charset="0"/>
+              </a:rPr>
+              <a:t>function </a:t>
+            </a:r>
+            <a:r>
+              <a:rPr lang="en-GB" sz="1800" dirty="0" err="1">
+                <a:latin typeface="Menlo" panose="020B0609030804020204" pitchFamily="49" charset="0"/>
+                <a:ea typeface="Menlo" panose="020B0609030804020204" pitchFamily="49" charset="0"/>
+                <a:cs typeface="Menlo" panose="020B0609030804020204" pitchFamily="49" charset="0"/>
+              </a:rPr>
+              <a:t>User_name</a:t>
+            </a:r>
+            <a:r>
+              <a:rPr lang="en-GB" sz="1800" dirty="0">
+                <a:latin typeface="Menlo" panose="020B0609030804020204" pitchFamily="49" charset="0"/>
+                <a:ea typeface="Menlo" panose="020B0609030804020204" pitchFamily="49" charset="0"/>
+                <a:cs typeface="Menlo" panose="020B0609030804020204" pitchFamily="49" charset="0"/>
+              </a:rPr>
+              <a:t>(user) {</a:t>
+            </a:r>
+            <a:br>
+              <a:rPr lang="en-GB" sz="1800" dirty="0">
+                <a:latin typeface="Menlo" panose="020B0609030804020204" pitchFamily="49" charset="0"/>
+                <a:ea typeface="Menlo" panose="020B0609030804020204" pitchFamily="49" charset="0"/>
+                <a:cs typeface="Menlo" panose="020B0609030804020204" pitchFamily="49" charset="0"/>
+              </a:rPr>
+            </a:br>
+            <a:r>
+              <a:rPr lang="en-GB" sz="1800" dirty="0">
+                <a:latin typeface="Menlo" panose="020B0609030804020204" pitchFamily="49" charset="0"/>
+                <a:ea typeface="Menlo" panose="020B0609030804020204" pitchFamily="49" charset="0"/>
+                <a:cs typeface="Menlo" panose="020B0609030804020204" pitchFamily="49" charset="0"/>
+              </a:rPr>
+              <a:t>  return </a:t>
+            </a:r>
+            <a:r>
+              <a:rPr lang="en-GB" sz="1800" dirty="0" err="1">
+                <a:latin typeface="Menlo" panose="020B0609030804020204" pitchFamily="49" charset="0"/>
+                <a:ea typeface="Menlo" panose="020B0609030804020204" pitchFamily="49" charset="0"/>
+                <a:cs typeface="Menlo" panose="020B0609030804020204" pitchFamily="49" charset="0"/>
+              </a:rPr>
+              <a:t>user.getName</a:t>
+            </a:r>
+            <a:r>
+              <a:rPr lang="en-GB" sz="1800" dirty="0">
+                <a:latin typeface="Menlo" panose="020B0609030804020204" pitchFamily="49" charset="0"/>
+                <a:ea typeface="Menlo" panose="020B0609030804020204" pitchFamily="49" charset="0"/>
+                <a:cs typeface="Menlo" panose="020B0609030804020204" pitchFamily="49" charset="0"/>
+              </a:rPr>
+              <a:t>()</a:t>
+            </a:r>
+            <a:br>
+              <a:rPr lang="en-GB" sz="1800" dirty="0">
+                <a:latin typeface="Menlo" panose="020B0609030804020204" pitchFamily="49" charset="0"/>
+                <a:ea typeface="Menlo" panose="020B0609030804020204" pitchFamily="49" charset="0"/>
+                <a:cs typeface="Menlo" panose="020B0609030804020204" pitchFamily="49" charset="0"/>
+              </a:rPr>
+            </a:br>
+            <a:r>
+              <a:rPr lang="en-GB" sz="1800" dirty="0">
+                <a:latin typeface="Menlo" panose="020B0609030804020204" pitchFamily="49" charset="0"/>
+                <a:ea typeface="Menlo" panose="020B0609030804020204" pitchFamily="49" charset="0"/>
+                <a:cs typeface="Menlo" panose="020B0609030804020204" pitchFamily="49" charset="0"/>
+              </a:rPr>
+              <a:t>}</a:t>
+            </a:r>
           </a:p>
         </p:txBody>
       </p:sp>

</xml_diff>